<commit_message>
Update 05  Gen AI - Business Apps.pptx
</commit_message>
<xml_diff>
--- a/slides/LLMs/05  Gen AI - Business Apps.pptx
+++ b/slides/LLMs/05  Gen AI - Business Apps.pptx
@@ -5,10 +5,10 @@
     <p:sldMasterId id="2147483648" r:id="rId1"/>
   </p:sldMasterIdLst>
   <p:notesMasterIdLst>
-    <p:notesMasterId r:id="rId16"/>
+    <p:notesMasterId r:id="rId18"/>
   </p:notesMasterIdLst>
   <p:handoutMasterIdLst>
-    <p:handoutMasterId r:id="rId17"/>
+    <p:handoutMasterId r:id="rId19"/>
   </p:handoutMasterIdLst>
   <p:sldIdLst>
     <p:sldId id="256" r:id="rId3"/>
@@ -23,7 +23,9 @@
     <p:sldId id="431" r:id="rId12"/>
     <p:sldId id="437" r:id="rId13"/>
     <p:sldId id="438" r:id="rId14"/>
-    <p:sldId id="1315" r:id="rId15"/>
+    <p:sldId id="1317" r:id="rId15"/>
+    <p:sldId id="1316" r:id="rId16"/>
+    <p:sldId id="1315" r:id="rId17"/>
   </p:sldIdLst>
   <p:sldSz cx="12192000" cy="6858000"/>
   <p:notesSz cx="6858000" cy="9144000"/>
@@ -4000,6 +4002,315 @@
         </p:nvSpPr>
         <p:spPr/>
         <p:txBody>
+          <a:bodyPr>
+            <a:normAutofit/>
+          </a:bodyPr>
+          <a:p>
+            <a:r>
+              <a:rPr lang="en-US" altLang="en-GB"/>
+              <a:t>Contents creation timeline</a:t>
+            </a:r>
+            <a:endParaRPr lang="en-US" altLang="en-GB"/>
+          </a:p>
+        </p:txBody>
+      </p:sp>
+      <p:sp>
+        <p:nvSpPr>
+          <p:cNvPr id="3" name="Content Placeholder 2"/>
+          <p:cNvSpPr>
+            <a:spLocks noGrp="1"/>
+          </p:cNvSpPr>
+          <p:nvPr>
+            <p:ph idx="1"/>
+          </p:nvPr>
+        </p:nvSpPr>
+        <p:spPr/>
+        <p:txBody>
+          <a:bodyPr>
+            <a:normAutofit fontScale="60000"/>
+          </a:bodyPr>
+          <a:p>
+            <a:r>
+              <a:rPr lang="zh-CN" altLang="en-US"/>
+              <a:t>🌐</a:t>
+            </a:r>
+            <a:r>
+              <a:rPr lang="en-US" altLang="en-GB"/>
+              <a:t> Web 1.0 (1990s) </a:t>
+            </a:r>
+            <a:r>
+              <a:rPr lang="zh-CN" altLang="en-US"/>
+              <a:t>🌐</a:t>
+            </a:r>
+            <a:r>
+              <a:rPr lang="en-US" altLang="en-GB"/>
+              <a:t> </a:t>
+            </a:r>
+            <a:r>
+              <a:rPr lang="en-US" altLang="en-US"/>
+              <a:t>➡</a:t>
+            </a:r>
+            <a:r>
+              <a:rPr lang="" altLang="en-US"/>
+              <a:t>️</a:t>
+            </a:r>
+            <a:r>
+              <a:rPr lang="en-US" altLang="en-GB"/>
+              <a:t> Static pages, one-way streets for information.</a:t>
+            </a:r>
+            <a:endParaRPr lang="en-US" altLang="en-GB"/>
+          </a:p>
+          <a:p>
+            <a:endParaRPr lang="en-US" altLang="en-GB"/>
+          </a:p>
+          <a:p>
+            <a:r>
+              <a:rPr lang="zh-CN" altLang="en-US"/>
+              <a:t>📸</a:t>
+            </a:r>
+            <a:r>
+              <a:rPr lang="en-US" altLang="en-GB"/>
+              <a:t> Web 2.0 (Early 2000s) </a:t>
+            </a:r>
+            <a:r>
+              <a:rPr lang="zh-CN" altLang="en-US"/>
+              <a:t>📸</a:t>
+            </a:r>
+            <a:r>
+              <a:rPr lang="en-US" altLang="en-GB"/>
+              <a:t> </a:t>
+            </a:r>
+            <a:r>
+              <a:rPr lang="en-US" altLang="en-US"/>
+              <a:t>➡</a:t>
+            </a:r>
+            <a:r>
+              <a:rPr lang="" altLang="en-US"/>
+              <a:t>️</a:t>
+            </a:r>
+            <a:r>
+              <a:rPr lang="en-US" altLang="en-GB"/>
+              <a:t> User-generated content via blogs and forums.</a:t>
+            </a:r>
+            <a:endParaRPr lang="en-US" altLang="en-GB"/>
+          </a:p>
+          <a:p>
+            <a:endParaRPr lang="en-US" altLang="en-GB"/>
+          </a:p>
+          <a:p>
+            <a:r>
+              <a:rPr lang="zh-CN" altLang="en-US"/>
+              <a:t>📱</a:t>
+            </a:r>
+            <a:r>
+              <a:rPr lang="en-US" altLang="en-GB"/>
+              <a:t> The Rise of Social Media (Mid-2000s) </a:t>
+            </a:r>
+            <a:r>
+              <a:rPr lang="zh-CN" altLang="en-US"/>
+              <a:t>📱</a:t>
+            </a:r>
+            <a:r>
+              <a:rPr lang="en-US" altLang="en-GB"/>
+              <a:t> </a:t>
+            </a:r>
+            <a:r>
+              <a:rPr lang="en-US" altLang="en-US"/>
+              <a:t>➡</a:t>
+            </a:r>
+            <a:r>
+              <a:rPr lang="" altLang="en-US"/>
+              <a:t>️</a:t>
+            </a:r>
+            <a:r>
+              <a:rPr lang="en-US" altLang="en-GB"/>
+              <a:t> Content creation exploded, share &amp; influence, "Viral" became a buzzword.</a:t>
+            </a:r>
+            <a:endParaRPr lang="en-US" altLang="en-GB"/>
+          </a:p>
+          <a:p>
+            <a:endParaRPr lang="en-US" altLang="en-GB"/>
+          </a:p>
+          <a:p>
+            <a:r>
+              <a:rPr lang="zh-CN" altLang="en-US"/>
+              <a:t>📱</a:t>
+            </a:r>
+            <a:r>
+              <a:rPr lang="en-US" altLang="en-GB"/>
+              <a:t> Mobile Era (2010s) </a:t>
+            </a:r>
+            <a:r>
+              <a:rPr lang="zh-CN" altLang="en-US"/>
+              <a:t>📱</a:t>
+            </a:r>
+            <a:r>
+              <a:rPr lang="en-US" altLang="en-GB"/>
+              <a:t> </a:t>
+            </a:r>
+            <a:r>
+              <a:rPr lang="en-US" altLang="en-US"/>
+              <a:t>➡</a:t>
+            </a:r>
+            <a:r>
+              <a:rPr lang="" altLang="en-US"/>
+              <a:t>️</a:t>
+            </a:r>
+            <a:r>
+              <a:rPr lang="en-US" altLang="en-GB"/>
+              <a:t> Content consumption habits changed, visual storytelling, short content.</a:t>
+            </a:r>
+            <a:endParaRPr lang="en-US" altLang="en-GB"/>
+          </a:p>
+          <a:p>
+            <a:endParaRPr lang="en-US" altLang="en-GB"/>
+          </a:p>
+          <a:p>
+            <a:r>
+              <a:rPr lang="zh-CN" altLang="en-US"/>
+              <a:t>🤖</a:t>
+            </a:r>
+            <a:r>
+              <a:rPr lang="en-US" altLang="en-GB"/>
+              <a:t> AI and Automation (Present) </a:t>
+            </a:r>
+            <a:r>
+              <a:rPr lang="zh-CN" altLang="en-US"/>
+              <a:t>🤖</a:t>
+            </a:r>
+            <a:r>
+              <a:rPr lang="en-US" altLang="en-GB"/>
+              <a:t> </a:t>
+            </a:r>
+            <a:r>
+              <a:rPr lang="en-US" altLang="en-US"/>
+              <a:t>➡</a:t>
+            </a:r>
+            <a:r>
+              <a:rPr lang="" altLang="en-US"/>
+              <a:t>️</a:t>
+            </a:r>
+            <a:r>
+              <a:rPr lang="en-US" altLang="en-GB"/>
+              <a:t> Today's helpers. Today, AI assists content creators with everything.</a:t>
+            </a:r>
+            <a:endParaRPr lang="en-US" altLang="en-GB"/>
+          </a:p>
+        </p:txBody>
+      </p:sp>
+      <p:sp>
+        <p:nvSpPr>
+          <p:cNvPr id="4" name="Slide Number Placeholder 3"/>
+          <p:cNvSpPr>
+            <a:spLocks noGrp="1"/>
+          </p:cNvSpPr>
+          <p:nvPr>
+            <p:ph type="sldNum" sz="quarter" idx="12"/>
+          </p:nvPr>
+        </p:nvSpPr>
+        <p:spPr/>
+        <p:txBody>
+          <a:bodyPr/>
+          <a:p>
+            <a:fld id="{9B618960-8005-486C-9A75-10CB2AAC16F9}" type="slidenum">
+              <a:rPr lang="en-US" smtClean="0"/>
+            </a:fld>
+            <a:endParaRPr lang="en-US"/>
+          </a:p>
+        </p:txBody>
+      </p:sp>
+    </p:spTree>
+  </p:cSld>
+  <p:clrMapOvr>
+    <a:masterClrMapping/>
+  </p:clrMapOvr>
+</p:sld>
+</file>
+
+<file path=ppt/slides/slide14.xml><?xml version="1.0" encoding="utf-8"?>
+<p:sld xmlns:a="http://schemas.openxmlformats.org/drawingml/2006/main" xmlns:r="http://schemas.openxmlformats.org/officeDocument/2006/relationships" xmlns:p="http://schemas.openxmlformats.org/presentationml/2006/main">
+  <p:cSld>
+    <p:spTree>
+      <p:nvGrpSpPr>
+        <p:cNvPr id="1" name=""/>
+        <p:cNvGrpSpPr/>
+        <p:nvPr/>
+      </p:nvGrpSpPr>
+      <p:grpSpPr/>
+      <p:sp>
+        <p:nvSpPr>
+          <p:cNvPr id="5" name="Title 4"/>
+          <p:cNvSpPr>
+            <a:spLocks noGrp="1"/>
+          </p:cNvSpPr>
+          <p:nvPr>
+            <p:ph type="title"/>
+          </p:nvPr>
+        </p:nvSpPr>
+        <p:spPr/>
+        <p:txBody>
+          <a:bodyPr/>
+          <a:p>
+            <a:pPr algn="ctr"/>
+            <a:r>
+              <a:rPr lang="en-US" altLang="en-GB"/>
+              <a:t>AI Agents </a:t>
+            </a:r>
+            <a:endParaRPr lang="en-US" altLang="en-GB"/>
+          </a:p>
+        </p:txBody>
+      </p:sp>
+      <p:sp>
+        <p:nvSpPr>
+          <p:cNvPr id="4" name="Slide Number Placeholder 3"/>
+          <p:cNvSpPr>
+            <a:spLocks noGrp="1"/>
+          </p:cNvSpPr>
+          <p:nvPr>
+            <p:ph type="sldNum" sz="quarter" idx="12"/>
+          </p:nvPr>
+        </p:nvSpPr>
+        <p:spPr/>
+        <p:txBody>
+          <a:bodyPr/>
+          <a:p>
+            <a:fld id="{9B618960-8005-486C-9A75-10CB2AAC16F9}" type="slidenum">
+              <a:rPr lang="en-US" smtClean="0"/>
+            </a:fld>
+            <a:endParaRPr lang="en-US"/>
+          </a:p>
+        </p:txBody>
+      </p:sp>
+    </p:spTree>
+  </p:cSld>
+  <p:clrMapOvr>
+    <a:masterClrMapping/>
+  </p:clrMapOvr>
+</p:sld>
+</file>
+
+<file path=ppt/slides/slide15.xml><?xml version="1.0" encoding="utf-8"?>
+<p:sld xmlns:a="http://schemas.openxmlformats.org/drawingml/2006/main" xmlns:r="http://schemas.openxmlformats.org/officeDocument/2006/relationships" xmlns:p="http://schemas.openxmlformats.org/presentationml/2006/main">
+  <p:cSld>
+    <p:spTree>
+      <p:nvGrpSpPr>
+        <p:cNvPr id="1" name=""/>
+        <p:cNvGrpSpPr/>
+        <p:nvPr/>
+      </p:nvGrpSpPr>
+      <p:grpSpPr/>
+      <p:sp>
+        <p:nvSpPr>
+          <p:cNvPr id="2" name="Title 1"/>
+          <p:cNvSpPr>
+            <a:spLocks noGrp="1"/>
+          </p:cNvSpPr>
+          <p:nvPr>
+            <p:ph type="title"/>
+          </p:nvPr>
+        </p:nvSpPr>
+        <p:spPr/>
+        <p:txBody>
           <a:bodyPr/>
           <a:p>
             <a:r>
@@ -4119,24 +4430,6 @@
               <a:rPr lang="en-US"/>
               <a:t>Generative AI and Business</a:t>
             </a:r>
-            <a:endParaRPr lang="en-US"/>
-          </a:p>
-        </p:txBody>
-      </p:sp>
-      <p:sp>
-        <p:nvSpPr>
-          <p:cNvPr id="5" name="Text Placeholder 4"/>
-          <p:cNvSpPr>
-            <a:spLocks noGrp="1"/>
-          </p:cNvSpPr>
-          <p:nvPr>
-            <p:ph type="body" idx="1"/>
-          </p:nvPr>
-        </p:nvSpPr>
-        <p:spPr/>
-        <p:txBody>
-          <a:bodyPr/>
-          <a:p>
             <a:endParaRPr lang="en-US"/>
           </a:p>
         </p:txBody>

</xml_diff>